<commit_message>
CARE & Related Work
</commit_message>
<xml_diff>
--- a/paper/AAAI 2021/TADAM.pptx
+++ b/paper/AAAI 2021/TADAM.pptx
@@ -273,7 +273,7 @@
           <a:p>
             <a:fld id="{A3661A17-B369-40A6-BAD3-08D18F542D5C}" type="datetimeFigureOut">
               <a:rPr lang="ko-KR" altLang="en-US" smtClean="0"/>
-              <a:t>2021-01-19</a:t>
+              <a:t>2021-01-20</a:t>
             </a:fld>
             <a:endParaRPr lang="ko-KR" altLang="en-US"/>
           </a:p>
@@ -10421,7 +10421,7 @@
             </a:r>
             <a:r>
               <a:rPr lang="en-US" altLang="ko-KR" dirty="0"/>
-              <a:t>Topic Segments</a:t>
+              <a:t>Each Topic Segment</a:t>
             </a:r>
             <a:r>
               <a:rPr lang="ko-KR" altLang="en-US" dirty="0"/>
@@ -10441,7 +10441,14 @@
             </a:r>
             <a:r>
               <a:rPr lang="ko-KR" altLang="en-US" dirty="0"/>
-              <a:t> 따짐</a:t>
+              <a:t> </a:t>
+            </a:r>
+            <a:br>
+              <a:rPr lang="en-US" altLang="ko-KR" dirty="0"/>
+            </a:br>
+            <a:r>
+              <a:rPr lang="ko-KR" altLang="en-US" dirty="0"/>
+              <a:t>따짐</a:t>
             </a:r>
             <a:endParaRPr lang="en-US" altLang="ko-KR" dirty="0"/>
           </a:p>
@@ -10952,15 +10959,19 @@
             </a:r>
             <a:r>
               <a:rPr lang="ko-KR" altLang="en-US" dirty="0"/>
-              <a:t>한 다음 각 </a:t>
-            </a:r>
-            <a:r>
-              <a:rPr lang="en-US" altLang="ko-KR" dirty="0"/>
-              <a:t>Split</a:t>
-            </a:r>
-            <a:r>
-              <a:rPr lang="ko-KR" altLang="en-US" dirty="0"/>
-              <a:t>과  </a:t>
+              <a:t>한 다음 </a:t>
+            </a:r>
+            <a:r>
+              <a:rPr lang="ko-KR" altLang="en-US"/>
+              <a:t>각 </a:t>
+            </a:r>
+            <a:r>
+              <a:rPr lang="en-US" altLang="ko-KR"/>
+              <a:t>Segment</a:t>
+            </a:r>
+            <a:r>
+              <a:rPr lang="ko-KR" altLang="en-US"/>
+              <a:t>와  </a:t>
             </a:r>
             <a:r>
               <a:rPr lang="en-US" altLang="ko-KR" dirty="0"/>

</xml_diff>